<commit_message>
small changes to submission
</commit_message>
<xml_diff>
--- a/Submission/Presentation/Final_Presentation_vF.pptx
+++ b/Submission/Presentation/Final_Presentation_vF.pptx
@@ -18,6 +18,7 @@
     <p:sldId id="270" r:id="rId12"/>
     <p:sldId id="272" r:id="rId13"/>
     <p:sldId id="271" r:id="rId14"/>
+    <p:sldId id="274" r:id="rId15"/>
   </p:sldIdLst>
   <p:sldSz cx="12192000" cy="6858000"/>
   <p:notesSz cx="6858000" cy="9144000"/>
@@ -8917,7 +8918,7 @@
           <a:p>
             <a:fld id="{6AD6EE87-EBD5-4F12-A48A-63ACA297AC8F}" type="datetimeFigureOut">
               <a:rPr lang="en-US" dirty="0"/>
-              <a:t>5/6/20</a:t>
+              <a:t>5/7/20</a:t>
             </a:fld>
             <a:endParaRPr lang="en-US" dirty="0"/>
           </a:p>
@@ -9119,7 +9120,7 @@
           <a:p>
             <a:fld id="{4CD73815-2707-4475-8F1A-B873CB631BB4}" type="datetimeFigureOut">
               <a:rPr lang="en-US" dirty="0"/>
-              <a:t>5/6/20</a:t>
+              <a:t>5/7/20</a:t>
             </a:fld>
             <a:endParaRPr lang="en-US" dirty="0"/>
           </a:p>
@@ -9294,7 +9295,7 @@
           <a:p>
             <a:fld id="{2A4AFB99-0EAB-4182-AFF8-E214C82A68F6}" type="datetimeFigureOut">
               <a:rPr lang="en-US" dirty="0"/>
-              <a:t>5/6/20</a:t>
+              <a:t>5/7/20</a:t>
             </a:fld>
             <a:endParaRPr lang="en-US" dirty="0"/>
           </a:p>
@@ -9494,7 +9495,7 @@
           <a:p>
             <a:fld id="{A5D3794B-289A-4A80-97D7-111025398D45}" type="datetimeFigureOut">
               <a:rPr lang="en-US" dirty="0"/>
-              <a:t>5/6/20</a:t>
+              <a:t>5/7/20</a:t>
             </a:fld>
             <a:endParaRPr lang="en-US" dirty="0"/>
           </a:p>
@@ -18387,7 +18388,7 @@
           <a:p>
             <a:fld id="{5A61015F-7CC6-4D0A-9D87-873EA4C304CC}" type="datetimeFigureOut">
               <a:rPr lang="en-US" dirty="0"/>
-              <a:t>5/6/20</a:t>
+              <a:t>5/7/20</a:t>
             </a:fld>
             <a:endParaRPr lang="en-US" dirty="0"/>
           </a:p>
@@ -18656,7 +18657,7 @@
           <a:p>
             <a:fld id="{93C6A301-0538-44EC-B09D-202E1042A48B}" type="datetimeFigureOut">
               <a:rPr lang="en-US" dirty="0"/>
-              <a:t>5/6/20</a:t>
+              <a:t>5/7/20</a:t>
             </a:fld>
             <a:endParaRPr lang="en-US" dirty="0"/>
           </a:p>
@@ -19049,7 +19050,7 @@
           <a:p>
             <a:fld id="{D789574A-8875-45EF-8EA2-3CAA0F7ABC4C}" type="datetimeFigureOut">
               <a:rPr lang="en-US" dirty="0"/>
-              <a:t>5/6/20</a:t>
+              <a:t>5/7/20</a:t>
             </a:fld>
             <a:endParaRPr lang="en-US" dirty="0"/>
           </a:p>
@@ -19162,7 +19163,7 @@
           <a:p>
             <a:fld id="{67EF4D4C-5367-4C26-9E2B-D8088D7FCA81}" type="datetimeFigureOut">
               <a:rPr lang="en-US" dirty="0"/>
-              <a:t>5/6/20</a:t>
+              <a:t>5/7/20</a:t>
             </a:fld>
             <a:endParaRPr lang="en-US" dirty="0"/>
           </a:p>
@@ -19252,7 +19253,7 @@
           <a:p>
             <a:fld id="{56E91E96-98B0-4413-9547-46F3504108EF}" type="datetimeFigureOut">
               <a:rPr lang="en-US" dirty="0"/>
-              <a:t>5/6/20</a:t>
+              <a:t>5/7/20</a:t>
             </a:fld>
             <a:endParaRPr lang="en-US" dirty="0"/>
           </a:p>
@@ -19537,7 +19538,7 @@
           <a:p>
             <a:fld id="{05C68B11-C5A8-448C-8CE9-B1A273C79CFC}" type="datetimeFigureOut">
               <a:rPr lang="en-US" dirty="0"/>
-              <a:t>5/6/20</a:t>
+              <a:t>5/7/20</a:t>
             </a:fld>
             <a:endParaRPr lang="en-US" dirty="0"/>
           </a:p>
@@ -19812,7 +19813,7 @@
           <a:p>
             <a:fld id="{C7616CA0-919D-4A49-9C8A-62FDFB3A5183}" type="datetimeFigureOut">
               <a:rPr lang="en-US" dirty="0"/>
-              <a:t>5/6/20</a:t>
+              <a:t>5/7/20</a:t>
             </a:fld>
             <a:endParaRPr lang="en-US" dirty="0"/>
           </a:p>
@@ -20058,7 +20059,7 @@
             <a:fld id="{90298CD5-6C1E-4009-B41F-6DF62E31D3BE}" type="datetimeFigureOut">
               <a:rPr lang="en-US" dirty="0"/>
               <a:pPr/>
-              <a:t>5/6/20</a:t>
+              <a:t>5/7/20</a:t>
             </a:fld>
             <a:endParaRPr lang="en-US" dirty="0"/>
           </a:p>
@@ -21140,6 +21141,143 @@
     <p:extLst>
       <p:ext uri="{BB962C8B-B14F-4D97-AF65-F5344CB8AC3E}">
         <p14:creationId xmlns:p14="http://schemas.microsoft.com/office/powerpoint/2010/main" val="2200351234"/>
+      </p:ext>
+    </p:extLst>
+  </p:cSld>
+  <p:clrMapOvr>
+    <a:masterClrMapping/>
+  </p:clrMapOvr>
+</p:sld>
+</file>
+
+<file path=ppt/slides/slide14.xml><?xml version="1.0" encoding="utf-8"?>
+<p:sld xmlns:a="http://schemas.openxmlformats.org/drawingml/2006/main" xmlns:r="http://schemas.openxmlformats.org/officeDocument/2006/relationships" xmlns:p="http://schemas.openxmlformats.org/presentationml/2006/main">
+  <p:cSld>
+    <p:spTree>
+      <p:nvGrpSpPr>
+        <p:cNvPr id="1" name=""/>
+        <p:cNvGrpSpPr/>
+        <p:nvPr/>
+      </p:nvGrpSpPr>
+      <p:grpSpPr>
+        <a:xfrm>
+          <a:off x="0" y="0"/>
+          <a:ext cx="0" cy="0"/>
+          <a:chOff x="0" y="0"/>
+          <a:chExt cx="0" cy="0"/>
+        </a:xfrm>
+      </p:grpSpPr>
+      <p:sp>
+        <p:nvSpPr>
+          <p:cNvPr id="2" name="Title 1">
+            <a:extLst>
+              <a:ext uri="{FF2B5EF4-FFF2-40B4-BE49-F238E27FC236}">
+                <a16:creationId xmlns:a16="http://schemas.microsoft.com/office/drawing/2014/main" id="{EDB1A1AD-75E3-774B-943E-5758BF24D97C}"/>
+              </a:ext>
+            </a:extLst>
+          </p:cNvPr>
+          <p:cNvSpPr>
+            <a:spLocks noGrp="1"/>
+          </p:cNvSpPr>
+          <p:nvPr>
+            <p:ph type="title"/>
+          </p:nvPr>
+        </p:nvSpPr>
+        <p:spPr/>
+        <p:txBody>
+          <a:bodyPr>
+            <a:normAutofit/>
+          </a:bodyPr>
+          <a:lstStyle/>
+          <a:p>
+            <a:r>
+              <a:rPr lang="en-US" sz="5400" dirty="0" err="1"/>
+              <a:t>QUEStions</a:t>
+            </a:r>
+            <a:r>
+              <a:rPr lang="en-US" sz="5400"/>
+              <a:t> &amp; Comments </a:t>
+            </a:r>
+            <a:br>
+              <a:rPr lang="en-US" sz="5400"/>
+            </a:br>
+            <a:r>
+              <a:rPr lang="en-US" sz="5400"/>
+              <a:t>are welcome</a:t>
+            </a:r>
+            <a:endParaRPr lang="en-US" sz="2700" dirty="0"/>
+          </a:p>
+        </p:txBody>
+      </p:sp>
+      <p:sp>
+        <p:nvSpPr>
+          <p:cNvPr id="4" name="Text Placeholder 3">
+            <a:extLst>
+              <a:ext uri="{FF2B5EF4-FFF2-40B4-BE49-F238E27FC236}">
+                <a16:creationId xmlns:a16="http://schemas.microsoft.com/office/drawing/2014/main" id="{D7702EF1-14B4-A843-99E3-6F30FC6E43BC}"/>
+              </a:ext>
+            </a:extLst>
+          </p:cNvPr>
+          <p:cNvSpPr>
+            <a:spLocks noGrp="1"/>
+          </p:cNvSpPr>
+          <p:nvPr>
+            <p:ph type="body" sz="half" idx="2"/>
+          </p:nvPr>
+        </p:nvSpPr>
+        <p:spPr/>
+        <p:txBody>
+          <a:bodyPr/>
+          <a:lstStyle/>
+          <a:p>
+            <a:r>
+              <a:rPr lang="en-US" dirty="0"/>
+              <a:t>Srishti Bhargava, Daniel Sabba</a:t>
+            </a:r>
+          </a:p>
+          <a:p>
+            <a:r>
+              <a:rPr lang="en-US" sz="1400" dirty="0"/>
+              <a:t>Courant Institute of Mathematical Sciences</a:t>
+            </a:r>
+          </a:p>
+          <a:p>
+            <a:r>
+              <a:rPr lang="en-US" sz="1400" dirty="0"/>
+              <a:t>New York University</a:t>
+            </a:r>
+          </a:p>
+        </p:txBody>
+      </p:sp>
+      <p:pic>
+        <p:nvPicPr>
+          <p:cNvPr id="10" name="Picture Placeholder 9" descr="A group of clouds in the sky&#10;&#10;Description automatically generated">
+            <a:extLst>
+              <a:ext uri="{FF2B5EF4-FFF2-40B4-BE49-F238E27FC236}">
+                <a16:creationId xmlns:a16="http://schemas.microsoft.com/office/drawing/2014/main" id="{AEFD9EF1-3FB6-EF48-BCEC-C61F4FAFA967}"/>
+              </a:ext>
+            </a:extLst>
+          </p:cNvPr>
+          <p:cNvPicPr>
+            <a:picLocks noGrp="1" noChangeAspect="1"/>
+          </p:cNvPicPr>
+          <p:nvPr>
+            <p:ph type="pic" idx="1"/>
+          </p:nvPr>
+        </p:nvPicPr>
+        <p:blipFill>
+          <a:blip r:embed="rId2"/>
+          <a:srcRect t="169" b="169"/>
+          <a:stretch>
+            <a:fillRect/>
+          </a:stretch>
+        </p:blipFill>
+        <p:spPr/>
+      </p:pic>
+    </p:spTree>
+    <p:extLst>
+      <p:ext uri="{BB962C8B-B14F-4D97-AF65-F5344CB8AC3E}">
+        <p14:creationId xmlns:p14="http://schemas.microsoft.com/office/powerpoint/2010/main" val="658174479"/>
       </p:ext>
     </p:extLst>
   </p:cSld>

</xml_diff>